<commit_message>
Video in Finale Präsentation eingefügt
</commit_message>
<xml_diff>
--- a/Finale Präsentation.pptx
+++ b/Finale Präsentation.pptx
@@ -3453,15 +3453,7 @@
           <a:p>
             <a:r>
               <a:rPr lang="de-DE" sz="8000" b="1" dirty="0" smtClean="0"/>
-              <a:t>Mensch ärgere </a:t>
-            </a:r>
-            <a:r>
-              <a:rPr lang="de-DE" sz="8000" b="1" dirty="0" smtClean="0"/>
-              <a:t>Dich </a:t>
-            </a:r>
-            <a:r>
-              <a:rPr lang="de-DE" sz="8000" b="1" dirty="0" smtClean="0"/>
-              <a:t>nicht</a:t>
+              <a:t>Mensch ärgere Dich nicht</a:t>
             </a:r>
             <a:endParaRPr lang="de-DE" sz="8000" b="1" dirty="0"/>
           </a:p>
@@ -4543,7 +4535,6 @@
               <a:rPr lang="de-DE" dirty="0" smtClean="0"/>
               <a:t>Einige nicht bedachte Risiken/Probleme tauchten während des Projektes auf, konnten jedoch gelöst werden. Dazu gehörten z.B. den Schattenwurf der Objekte, Drehung des/der Spielfeldes/Kamera, Klick-Events der Maus und die Logik des Setzverfahrens.</a:t>
             </a:r>
-            <a:endParaRPr lang="de-DE" dirty="0" smtClean="0"/>
           </a:p>
         </p:txBody>
       </p:sp>
@@ -4673,7 +4664,6 @@
               <a:rPr lang="de-DE" dirty="0"/>
               <a:t>Vergleich Projektplanung/Realität</a:t>
             </a:r>
-            <a:endParaRPr lang="de-DE" dirty="0"/>
           </a:p>
         </p:txBody>
       </p:sp>
@@ -6250,14 +6240,12 @@
               <a:rPr lang="de-DE" dirty="0" smtClean="0"/>
               <a:t>Aufgaben</a:t>
             </a:r>
-            <a:endParaRPr lang="de-DE" dirty="0" smtClean="0"/>
           </a:p>
           <a:p>
             <a:r>
               <a:rPr lang="de-DE" dirty="0" smtClean="0"/>
               <a:t>Entwicklungsstadien der Anwendung</a:t>
             </a:r>
-            <a:endParaRPr lang="de-DE" dirty="0" smtClean="0"/>
           </a:p>
         </p:txBody>
       </p:sp>
@@ -7180,30 +7168,6 @@
       </p:sp>
       <p:sp>
         <p:nvSpPr>
-          <p:cNvPr id="3" name="Inhaltsplatzhalter 2"/>
-          <p:cNvSpPr>
-            <a:spLocks noGrp="1"/>
-          </p:cNvSpPr>
-          <p:nvPr>
-            <p:ph idx="1"/>
-          </p:nvPr>
-        </p:nvSpPr>
-        <p:spPr>
-          <a:xfrm>
-            <a:off x="838200" y="1560737"/>
-            <a:ext cx="10515600" cy="4680000"/>
-          </a:xfrm>
-        </p:spPr>
-        <p:txBody>
-          <a:bodyPr/>
-          <a:lstStyle/>
-          <a:p>
-            <a:endParaRPr lang="de-DE"/>
-          </a:p>
-        </p:txBody>
-      </p:sp>
-      <p:sp>
-        <p:nvSpPr>
           <p:cNvPr id="4" name="Datumsplatzhalter 3"/>
           <p:cNvSpPr>
             <a:spLocks noGrp="1"/>
@@ -7264,6 +7228,38 @@
               <a:t>3</a:t>
             </a:fld>
             <a:endParaRPr lang="de-DE"/>
+          </a:p>
+        </p:txBody>
+      </p:sp>
+      <p:sp>
+        <p:nvSpPr>
+          <p:cNvPr id="8" name="Inhaltsplatzhalter 7"/>
+          <p:cNvSpPr>
+            <a:spLocks noGrp="1"/>
+          </p:cNvSpPr>
+          <p:nvPr>
+            <p:ph idx="1"/>
+          </p:nvPr>
+        </p:nvSpPr>
+        <p:spPr/>
+        <p:txBody>
+          <a:bodyPr/>
+          <a:lstStyle/>
+          <a:p>
+            <a:pPr marL="0" indent="0">
+              <a:buNone/>
+            </a:pPr>
+            <a:r>
+              <a:rPr lang="de-DE" dirty="0" smtClean="0">
+                <a:hlinkClick r:id="rId2"/>
+              </a:rPr>
+              <a:t>Link</a:t>
+            </a:r>
+            <a:r>
+              <a:rPr lang="de-DE" dirty="0" smtClean="0"/>
+              <a:t> zum Video</a:t>
+            </a:r>
+            <a:endParaRPr lang="de-DE" dirty="0"/>
           </a:p>
         </p:txBody>
       </p:sp>

</xml_diff>